<commit_message>
Added .NET Core and presentation updates
</commit_message>
<xml_diff>
--- a/presentation/IOC-Talk.pptx
+++ b/presentation/IOC-Talk.pptx
@@ -5,7 +5,7 @@
     <p:sldMasterId id="2147484166" r:id="rId1"/>
   </p:sldMasterIdLst>
   <p:notesMasterIdLst>
-    <p:notesMasterId r:id="rId34"/>
+    <p:notesMasterId r:id="rId35"/>
   </p:notesMasterIdLst>
   <p:sldIdLst>
     <p:sldId id="256" r:id="rId2"/>
@@ -34,12 +34,13 @@
     <p:sldId id="283" r:id="rId25"/>
     <p:sldId id="284" r:id="rId26"/>
     <p:sldId id="285" r:id="rId27"/>
-    <p:sldId id="286" r:id="rId28"/>
+    <p:sldId id="293" r:id="rId28"/>
     <p:sldId id="290" r:id="rId29"/>
     <p:sldId id="292" r:id="rId30"/>
-    <p:sldId id="282" r:id="rId31"/>
-    <p:sldId id="280" r:id="rId32"/>
-    <p:sldId id="281" r:id="rId33"/>
+    <p:sldId id="286" r:id="rId31"/>
+    <p:sldId id="282" r:id="rId32"/>
+    <p:sldId id="280" r:id="rId33"/>
+    <p:sldId id="281" r:id="rId34"/>
   </p:sldIdLst>
   <p:sldSz cx="12192000" cy="6858000"/>
   <p:notesSz cx="6858000" cy="9144000"/>
@@ -231,7 +232,7 @@
           <a:p>
             <a:fld id="{A86C0856-25BF-440F-9649-6C468F4DAD46}" type="datetimeFigureOut">
               <a:rPr lang="en-US" smtClean="0"/>
-              <a:t>2/14/2017</a:t>
+              <a:t>2/15/2017</a:t>
             </a:fld>
             <a:endParaRPr lang="en-US"/>
           </a:p>
@@ -2509,7 +2510,7 @@
           <a:p>
             <a:fld id="{5650E687-3C63-4E4E-833F-4F1FE52298BE}" type="datetimeFigureOut">
               <a:rPr lang="en-US" smtClean="0"/>
-              <a:t>2/14/2017</a:t>
+              <a:t>2/15/2017</a:t>
             </a:fld>
             <a:endParaRPr lang="en-US"/>
           </a:p>
@@ -2722,7 +2723,7 @@
           <a:p>
             <a:fld id="{5650E687-3C63-4E4E-833F-4F1FE52298BE}" type="datetimeFigureOut">
               <a:rPr lang="en-US" smtClean="0"/>
-              <a:t>2/14/2017</a:t>
+              <a:t>2/15/2017</a:t>
             </a:fld>
             <a:endParaRPr lang="en-US"/>
           </a:p>
@@ -2978,7 +2979,7 @@
           <a:p>
             <a:fld id="{5650E687-3C63-4E4E-833F-4F1FE52298BE}" type="datetimeFigureOut">
               <a:rPr lang="en-US" smtClean="0"/>
-              <a:t>2/14/2017</a:t>
+              <a:t>2/15/2017</a:t>
             </a:fld>
             <a:endParaRPr lang="en-US"/>
           </a:p>
@@ -3152,7 +3153,7 @@
           <a:p>
             <a:fld id="{5650E687-3C63-4E4E-833F-4F1FE52298BE}" type="datetimeFigureOut">
               <a:rPr lang="en-US" smtClean="0"/>
-              <a:t>2/14/2017</a:t>
+              <a:t>2/15/2017</a:t>
             </a:fld>
             <a:endParaRPr lang="en-US"/>
           </a:p>
@@ -3495,7 +3496,7 @@
           <a:p>
             <a:fld id="{5650E687-3C63-4E4E-833F-4F1FE52298BE}" type="datetimeFigureOut">
               <a:rPr lang="en-US" smtClean="0"/>
-              <a:t>2/14/2017</a:t>
+              <a:t>2/15/2017</a:t>
             </a:fld>
             <a:endParaRPr lang="en-US"/>
           </a:p>
@@ -3770,7 +3771,7 @@
           <a:p>
             <a:fld id="{5650E687-3C63-4E4E-833F-4F1FE52298BE}" type="datetimeFigureOut">
               <a:rPr lang="en-US" smtClean="0"/>
-              <a:t>2/14/2017</a:t>
+              <a:t>2/15/2017</a:t>
             </a:fld>
             <a:endParaRPr lang="en-US"/>
           </a:p>
@@ -4149,7 +4150,7 @@
           <a:p>
             <a:fld id="{5650E687-3C63-4E4E-833F-4F1FE52298BE}" type="datetimeFigureOut">
               <a:rPr lang="en-US" smtClean="0"/>
-              <a:t>2/14/2017</a:t>
+              <a:t>2/15/2017</a:t>
             </a:fld>
             <a:endParaRPr lang="en-US"/>
           </a:p>
@@ -4267,7 +4268,7 @@
           <a:p>
             <a:fld id="{5650E687-3C63-4E4E-833F-4F1FE52298BE}" type="datetimeFigureOut">
               <a:rPr lang="en-US" smtClean="0"/>
-              <a:t>2/14/2017</a:t>
+              <a:t>2/15/2017</a:t>
             </a:fld>
             <a:endParaRPr lang="en-US"/>
           </a:p>
@@ -4438,7 +4439,7 @@
           <a:p>
             <a:fld id="{5650E687-3C63-4E4E-833F-4F1FE52298BE}" type="datetimeFigureOut">
               <a:rPr lang="en-US" smtClean="0"/>
-              <a:t>2/14/2017</a:t>
+              <a:t>2/15/2017</a:t>
             </a:fld>
             <a:endParaRPr lang="en-US"/>
           </a:p>
@@ -4797,7 +4798,7 @@
           <a:p>
             <a:fld id="{5650E687-3C63-4E4E-833F-4F1FE52298BE}" type="datetimeFigureOut">
               <a:rPr lang="en-US" smtClean="0"/>
-              <a:t>2/14/2017</a:t>
+              <a:t>2/15/2017</a:t>
             </a:fld>
             <a:endParaRPr lang="en-US"/>
           </a:p>
@@ -5184,7 +5185,7 @@
           <a:p>
             <a:fld id="{5650E687-3C63-4E4E-833F-4F1FE52298BE}" type="datetimeFigureOut">
               <a:rPr lang="en-US" smtClean="0"/>
-              <a:t>2/14/2017</a:t>
+              <a:t>2/15/2017</a:t>
             </a:fld>
             <a:endParaRPr lang="en-US"/>
           </a:p>
@@ -5471,7 +5472,7 @@
           <a:p>
             <a:fld id="{5650E687-3C63-4E4E-833F-4F1FE52298BE}" type="datetimeFigureOut">
               <a:rPr lang="en-US" smtClean="0"/>
-              <a:t>2/14/2017</a:t>
+              <a:t>2/15/2017</a:t>
             </a:fld>
             <a:endParaRPr lang="en-US"/>
           </a:p>
@@ -9202,7 +9203,7 @@
           <a:p>
             <a:r>
               <a:rPr lang="en-US" dirty="0"/>
-              <a:t>Putting it together</a:t>
+              <a:t>My Go To Features</a:t>
             </a:r>
           </a:p>
         </p:txBody>
@@ -9220,7 +9221,7 @@
         <p:spPr/>
         <p:txBody>
           <a:bodyPr>
-            <a:normAutofit lnSpcReduction="10000"/>
+            <a:normAutofit/>
           </a:bodyPr>
           <a:lstStyle/>
           <a:p>
@@ -9230,75 +9231,8 @@
               </a:lnSpc>
             </a:pPr>
             <a:r>
-              <a:rPr lang="en-US" dirty="0"/>
-              <a:t>Containers seem to focus on fine tuning one or the other</a:t>
-            </a:r>
-          </a:p>
-          <a:p>
-            <a:pPr lvl="1">
-              <a:lnSpc>
-                <a:spcPct val="100000"/>
-              </a:lnSpc>
-            </a:pPr>
-            <a:r>
-              <a:rPr lang="en-US" dirty="0"/>
-              <a:t>Performance</a:t>
-            </a:r>
-          </a:p>
-          <a:p>
-            <a:pPr lvl="1">
-              <a:lnSpc>
-                <a:spcPct val="100000"/>
-              </a:lnSpc>
-            </a:pPr>
-            <a:r>
-              <a:rPr lang="en-US" dirty="0"/>
-              <a:t>Ease of Use</a:t>
-            </a:r>
-          </a:p>
-          <a:p>
-            <a:pPr marL="0">
-              <a:lnSpc>
-                <a:spcPct val="150000"/>
-              </a:lnSpc>
-              <a:buNone/>
-            </a:pPr>
-            <a:r>
-              <a:rPr lang="en-US" dirty="0"/>
-              <a:t>Choose a container that best suites the needs of your application</a:t>
-            </a:r>
-          </a:p>
-          <a:p>
-            <a:pPr lvl="1">
-              <a:lnSpc>
-                <a:spcPct val="100000"/>
-              </a:lnSpc>
-            </a:pPr>
-            <a:r>
-              <a:rPr lang="en-US" dirty="0"/>
-              <a:t>High transaction web app / service</a:t>
-            </a:r>
-          </a:p>
-          <a:p>
-            <a:pPr lvl="1">
-              <a:lnSpc>
-                <a:spcPct val="100000"/>
-              </a:lnSpc>
-            </a:pPr>
-            <a:r>
-              <a:rPr lang="en-US" dirty="0"/>
-              <a:t>One off console application</a:t>
-            </a:r>
-          </a:p>
-          <a:p>
-            <a:pPr lvl="1">
-              <a:lnSpc>
-                <a:spcPct val="100000"/>
-              </a:lnSpc>
-            </a:pPr>
-            <a:r>
-              <a:rPr lang="en-US" dirty="0"/>
-              <a:t>IOC Containers sole purpose is to make things easier for you</a:t>
+              <a:rPr lang="en-US" sz="3200" dirty="0"/>
+              <a:t>Convention based registration</a:t>
             </a:r>
           </a:p>
           <a:p>
@@ -9308,34 +9242,8 @@
               </a:lnSpc>
             </a:pPr>
             <a:r>
-              <a:rPr lang="en-US" dirty="0"/>
-              <a:t>Use one that is widely adopted</a:t>
-            </a:r>
-          </a:p>
-          <a:p>
-            <a:pPr lvl="1">
-              <a:lnSpc>
-                <a:spcPct val="100000"/>
-              </a:lnSpc>
-            </a:pPr>
-            <a:r>
-              <a:rPr lang="en-US" dirty="0" err="1"/>
-              <a:t>Github</a:t>
-            </a:r>
-            <a:r>
-              <a:rPr lang="en-US" dirty="0"/>
-              <a:t> – active contributions</a:t>
-            </a:r>
-          </a:p>
-          <a:p>
-            <a:pPr lvl="1">
-              <a:lnSpc>
-                <a:spcPct val="100000"/>
-              </a:lnSpc>
-            </a:pPr>
-            <a:r>
-              <a:rPr lang="en-US" dirty="0"/>
-              <a:t>Frequent release cycles</a:t>
+              <a:rPr lang="en-US" sz="3200" dirty="0"/>
+              <a:t>Lifecycle Management</a:t>
             </a:r>
           </a:p>
           <a:p>
@@ -9344,14 +9252,17 @@
                 <a:spcPct val="150000"/>
               </a:lnSpc>
             </a:pPr>
-            <a:endParaRPr lang="en-US" dirty="0"/>
+            <a:r>
+              <a:rPr lang="en-US" sz="3200" dirty="0"/>
+              <a:t>SPEEEEEEEEEEEEEEEEED!!!</a:t>
+            </a:r>
           </a:p>
         </p:txBody>
       </p:sp>
     </p:spTree>
     <p:extLst>
       <p:ext uri="{BB962C8B-B14F-4D97-AF65-F5344CB8AC3E}">
-        <p14:creationId xmlns:p14="http://schemas.microsoft.com/office/powerpoint/2010/main" val="4190966320"/>
+        <p14:creationId xmlns:p14="http://schemas.microsoft.com/office/powerpoint/2010/main" val="131275089"/>
       </p:ext>
     </p:extLst>
   </p:cSld>
@@ -9850,6 +9761,28 @@
       </p:grpSpPr>
       <p:sp>
         <p:nvSpPr>
+          <p:cNvPr id="2" name="Title 1"/>
+          <p:cNvSpPr>
+            <a:spLocks noGrp="1"/>
+          </p:cNvSpPr>
+          <p:nvPr>
+            <p:ph type="title"/>
+          </p:nvPr>
+        </p:nvSpPr>
+        <p:spPr/>
+        <p:txBody>
+          <a:bodyPr/>
+          <a:lstStyle/>
+          <a:p>
+            <a:r>
+              <a:rPr lang="en-US" dirty="0"/>
+              <a:t>Putting it together</a:t>
+            </a:r>
+          </a:p>
+        </p:txBody>
+      </p:sp>
+      <p:sp>
+        <p:nvSpPr>
           <p:cNvPr id="3" name="Content Placeholder 2"/>
           <p:cNvSpPr>
             <a:spLocks noGrp="1"/>
@@ -9858,30 +9791,141 @@
             <p:ph idx="1"/>
           </p:nvPr>
         </p:nvSpPr>
-        <p:spPr>
-          <a:xfrm>
-            <a:off x="1106611" y="3046445"/>
-            <a:ext cx="10058400" cy="2524070"/>
-          </a:xfrm>
-        </p:spPr>
+        <p:spPr/>
         <p:txBody>
           <a:bodyPr>
-            <a:normAutofit/>
+            <a:normAutofit lnSpcReduction="10000"/>
           </a:bodyPr>
           <a:lstStyle/>
           <a:p>
-            <a:pPr algn="ctr"/>
-            <a:r>
-              <a:rPr lang="en-US" sz="5400" dirty="0"/>
-              <a:t>Questions?</a:t>
-            </a:r>
+            <a:pPr>
+              <a:lnSpc>
+                <a:spcPct val="150000"/>
+              </a:lnSpc>
+            </a:pPr>
+            <a:r>
+              <a:rPr lang="en-US" dirty="0"/>
+              <a:t>Containers seem to focus on fine tuning one or the other</a:t>
+            </a:r>
+          </a:p>
+          <a:p>
+            <a:pPr lvl="1">
+              <a:lnSpc>
+                <a:spcPct val="100000"/>
+              </a:lnSpc>
+            </a:pPr>
+            <a:r>
+              <a:rPr lang="en-US" dirty="0"/>
+              <a:t>Performance</a:t>
+            </a:r>
+          </a:p>
+          <a:p>
+            <a:pPr lvl="1">
+              <a:lnSpc>
+                <a:spcPct val="100000"/>
+              </a:lnSpc>
+            </a:pPr>
+            <a:r>
+              <a:rPr lang="en-US" dirty="0"/>
+              <a:t>Ease of Use</a:t>
+            </a:r>
+          </a:p>
+          <a:p>
+            <a:pPr marL="0">
+              <a:lnSpc>
+                <a:spcPct val="150000"/>
+              </a:lnSpc>
+              <a:buNone/>
+            </a:pPr>
+            <a:r>
+              <a:rPr lang="en-US" dirty="0"/>
+              <a:t>Choose a container that best suites the needs of your application</a:t>
+            </a:r>
+          </a:p>
+          <a:p>
+            <a:pPr lvl="1">
+              <a:lnSpc>
+                <a:spcPct val="100000"/>
+              </a:lnSpc>
+            </a:pPr>
+            <a:r>
+              <a:rPr lang="en-US" dirty="0"/>
+              <a:t>High transaction web app / service</a:t>
+            </a:r>
+          </a:p>
+          <a:p>
+            <a:pPr lvl="1">
+              <a:lnSpc>
+                <a:spcPct val="100000"/>
+              </a:lnSpc>
+            </a:pPr>
+            <a:r>
+              <a:rPr lang="en-US" dirty="0"/>
+              <a:t>One off console application</a:t>
+            </a:r>
+          </a:p>
+          <a:p>
+            <a:pPr lvl="1">
+              <a:lnSpc>
+                <a:spcPct val="100000"/>
+              </a:lnSpc>
+            </a:pPr>
+            <a:r>
+              <a:rPr lang="en-US" dirty="0"/>
+              <a:t>IOC Containers sole purpose is to make things easier for you</a:t>
+            </a:r>
+          </a:p>
+          <a:p>
+            <a:pPr>
+              <a:lnSpc>
+                <a:spcPct val="150000"/>
+              </a:lnSpc>
+            </a:pPr>
+            <a:r>
+              <a:rPr lang="en-US" dirty="0"/>
+              <a:t>Use one that is widely adopted</a:t>
+            </a:r>
+          </a:p>
+          <a:p>
+            <a:pPr lvl="1">
+              <a:lnSpc>
+                <a:spcPct val="100000"/>
+              </a:lnSpc>
+            </a:pPr>
+            <a:r>
+              <a:rPr lang="en-US" dirty="0" err="1"/>
+              <a:t>Github</a:t>
+            </a:r>
+            <a:r>
+              <a:rPr lang="en-US" dirty="0"/>
+              <a:t> – active contributions</a:t>
+            </a:r>
+          </a:p>
+          <a:p>
+            <a:pPr lvl="1">
+              <a:lnSpc>
+                <a:spcPct val="100000"/>
+              </a:lnSpc>
+            </a:pPr>
+            <a:r>
+              <a:rPr lang="en-US" dirty="0"/>
+              <a:t>Frequent release cycles</a:t>
+            </a:r>
+          </a:p>
+          <a:p>
+            <a:pPr>
+              <a:lnSpc>
+                <a:spcPct val="150000"/>
+              </a:lnSpc>
+            </a:pPr>
+            <a:endParaRPr lang="en-US" dirty="0"/>
           </a:p>
         </p:txBody>
       </p:sp>
     </p:spTree>
     <p:extLst>
       <p:ext uri="{BB962C8B-B14F-4D97-AF65-F5344CB8AC3E}">
-        <p14:creationId xmlns:p14="http://schemas.microsoft.com/office/powerpoint/2010/main" val="318071797"/>
+        <p14:creationId xmlns:p14="http://schemas.microsoft.com/office/powerpoint/2010/main" val="4190966320"/>
       </p:ext>
     </p:extLst>
   </p:cSld>
@@ -9933,8 +9977,99 @@
             <a:pPr algn="ctr"/>
             <a:r>
               <a:rPr lang="en-US" sz="5400" dirty="0"/>
+              <a:t>Questions?</a:t>
+            </a:r>
+          </a:p>
+        </p:txBody>
+      </p:sp>
+    </p:spTree>
+    <p:extLst>
+      <p:ext uri="{BB962C8B-B14F-4D97-AF65-F5344CB8AC3E}">
+        <p14:creationId xmlns:p14="http://schemas.microsoft.com/office/powerpoint/2010/main" val="318071797"/>
+      </p:ext>
+    </p:extLst>
+  </p:cSld>
+  <p:clrMapOvr>
+    <a:masterClrMapping/>
+  </p:clrMapOvr>
+</p:sld>
+</file>
+
+<file path=ppt/slides/slide32.xml><?xml version="1.0" encoding="utf-8"?>
+<p:sld xmlns:a="http://schemas.openxmlformats.org/drawingml/2006/main" xmlns:r="http://schemas.openxmlformats.org/officeDocument/2006/relationships" xmlns:p="http://schemas.openxmlformats.org/presentationml/2006/main">
+  <p:cSld>
+    <p:spTree>
+      <p:nvGrpSpPr>
+        <p:cNvPr id="1" name=""/>
+        <p:cNvGrpSpPr/>
+        <p:nvPr/>
+      </p:nvGrpSpPr>
+      <p:grpSpPr>
+        <a:xfrm>
+          <a:off x="0" y="0"/>
+          <a:ext cx="0" cy="0"/>
+          <a:chOff x="0" y="0"/>
+          <a:chExt cx="0" cy="0"/>
+        </a:xfrm>
+      </p:grpSpPr>
+      <p:sp>
+        <p:nvSpPr>
+          <p:cNvPr id="3" name="Content Placeholder 2"/>
+          <p:cNvSpPr>
+            <a:spLocks noGrp="1"/>
+          </p:cNvSpPr>
+          <p:nvPr>
+            <p:ph idx="1"/>
+          </p:nvPr>
+        </p:nvSpPr>
+        <p:spPr>
+          <a:xfrm>
+            <a:off x="1106611" y="3046445"/>
+            <a:ext cx="10058400" cy="2524070"/>
+          </a:xfrm>
+        </p:spPr>
+        <p:txBody>
+          <a:bodyPr>
+            <a:normAutofit lnSpcReduction="10000"/>
+          </a:bodyPr>
+          <a:lstStyle/>
+          <a:p>
+            <a:pPr algn="ctr"/>
+            <a:r>
+              <a:rPr lang="en-US" sz="5400" dirty="0"/>
               <a:t>THANK YOU!!!</a:t>
             </a:r>
+          </a:p>
+          <a:p>
+            <a:pPr algn="ctr"/>
+            <a:endParaRPr lang="en-US" sz="5400" dirty="0"/>
+          </a:p>
+          <a:p>
+            <a:pPr marL="0" indent="0" algn="ctr">
+              <a:buNone/>
+            </a:pPr>
+            <a:r>
+              <a:rPr lang="en-US" sz="2400" dirty="0"/>
+              <a:t>Presentation and slides can be found here</a:t>
+            </a:r>
+          </a:p>
+          <a:p>
+            <a:pPr marL="0" indent="0" algn="ctr">
+              <a:buNone/>
+            </a:pPr>
+            <a:r>
+              <a:rPr lang="en-US" dirty="0">
+                <a:hlinkClick r:id="rId2"/>
+              </a:rPr>
+              <a:t>https://github.com/jrob5756/IocTalk</a:t>
+            </a:r>
+            <a:endParaRPr lang="en-US" dirty="0"/>
+          </a:p>
+          <a:p>
+            <a:pPr marL="0" indent="0" algn="ctr">
+              <a:buNone/>
+            </a:pPr>
+            <a:endParaRPr lang="en-US" dirty="0"/>
           </a:p>
         </p:txBody>
       </p:sp>
@@ -9951,7 +10086,7 @@
 </p:sld>
 </file>
 
-<file path=ppt/slides/slide32.xml><?xml version="1.0" encoding="utf-8"?>
+<file path=ppt/slides/slide33.xml><?xml version="1.0" encoding="utf-8"?>
 <p:sld xmlns:a="http://schemas.openxmlformats.org/drawingml/2006/main" xmlns:r="http://schemas.openxmlformats.org/officeDocument/2006/relationships" xmlns:p="http://schemas.openxmlformats.org/presentationml/2006/main">
   <p:cSld>
     <p:spTree>

</xml_diff>